<commit_message>
changes after sonversation with teacher
</commit_message>
<xml_diff>
--- a/documentation/защита курсача.pptx
+++ b/documentation/защита курсача.pptx
@@ -156,7 +156,7 @@
           <p:cNvPr id="2" name="Заголовок 1">
             <a:extLst>
               <a:ext uri="{FF2B5EF4-FFF2-40B4-BE49-F238E27FC236}">
-                <a16:creationId xmlns="" xmlns:a16="http://schemas.microsoft.com/office/drawing/2014/main" id="{670A1A5D-5A81-47DB-BE2C-03E0990F0D73}"/>
+                <a16:creationId xmlns:a16="http://schemas.microsoft.com/office/drawing/2014/main" xmlns="" id="{670A1A5D-5A81-47DB-BE2C-03E0990F0D73}"/>
               </a:ext>
             </a:extLst>
           </p:cNvPr>
@@ -197,7 +197,7 @@
           <p:cNvPr id="3" name="Подзаголовок 2">
             <a:extLst>
               <a:ext uri="{FF2B5EF4-FFF2-40B4-BE49-F238E27FC236}">
-                <a16:creationId xmlns="" xmlns:a16="http://schemas.microsoft.com/office/drawing/2014/main" id="{6D18D89D-FEB0-4064-AD3B-357BF020BCDA}"/>
+                <a16:creationId xmlns:a16="http://schemas.microsoft.com/office/drawing/2014/main" xmlns="" id="{6D18D89D-FEB0-4064-AD3B-357BF020BCDA}"/>
               </a:ext>
             </a:extLst>
           </p:cNvPr>
@@ -271,7 +271,7 @@
           <p:cNvPr id="4" name="Дата 3">
             <a:extLst>
               <a:ext uri="{FF2B5EF4-FFF2-40B4-BE49-F238E27FC236}">
-                <a16:creationId xmlns="" xmlns:a16="http://schemas.microsoft.com/office/drawing/2014/main" id="{0C08CCA0-7AC9-4458-99BC-25257703BE5B}"/>
+                <a16:creationId xmlns:a16="http://schemas.microsoft.com/office/drawing/2014/main" xmlns="" id="{0C08CCA0-7AC9-4458-99BC-25257703BE5B}"/>
               </a:ext>
             </a:extLst>
           </p:cNvPr>
@@ -298,7 +298,7 @@
             <a:fld id="{39985775-DA12-4519-AD4E-BF0D8B5A28A2}" type="datetimeFigureOut">
               <a:rPr lang="ru-RU" smtClean="0"/>
               <a:pPr/>
-              <a:t>07.12.2022</a:t>
+              <a:t>08.12.2022</a:t>
             </a:fld>
             <a:endParaRPr lang="ru-RU"/>
           </a:p>
@@ -309,7 +309,7 @@
           <p:cNvPr id="5" name="Нижний колонтитул 4">
             <a:extLst>
               <a:ext uri="{FF2B5EF4-FFF2-40B4-BE49-F238E27FC236}">
-                <a16:creationId xmlns="" xmlns:a16="http://schemas.microsoft.com/office/drawing/2014/main" id="{DF7410E7-85CD-46DA-BC17-90383213823C}"/>
+                <a16:creationId xmlns:a16="http://schemas.microsoft.com/office/drawing/2014/main" xmlns="" id="{DF7410E7-85CD-46DA-BC17-90383213823C}"/>
               </a:ext>
             </a:extLst>
           </p:cNvPr>
@@ -342,7 +342,7 @@
           <p:cNvPr id="6" name="Номер слайда 5">
             <a:extLst>
               <a:ext uri="{FF2B5EF4-FFF2-40B4-BE49-F238E27FC236}">
-                <a16:creationId xmlns="" xmlns:a16="http://schemas.microsoft.com/office/drawing/2014/main" id="{3CC549DF-D60D-41D0-9ADE-DA8EA16AD11F}"/>
+                <a16:creationId xmlns:a16="http://schemas.microsoft.com/office/drawing/2014/main" xmlns="" id="{3CC549DF-D60D-41D0-9ADE-DA8EA16AD11F}"/>
               </a:ext>
             </a:extLst>
           </p:cNvPr>
@@ -422,7 +422,7 @@
           <p:cNvPr id="2" name="Заголовок 1">
             <a:extLst>
               <a:ext uri="{FF2B5EF4-FFF2-40B4-BE49-F238E27FC236}">
-                <a16:creationId xmlns="" xmlns:a16="http://schemas.microsoft.com/office/drawing/2014/main" id="{B6A3F95C-774F-4E30-AE17-04AC0612DF47}"/>
+                <a16:creationId xmlns:a16="http://schemas.microsoft.com/office/drawing/2014/main" xmlns="" id="{B6A3F95C-774F-4E30-AE17-04AC0612DF47}"/>
               </a:ext>
             </a:extLst>
           </p:cNvPr>
@@ -450,7 +450,7 @@
           <p:cNvPr id="3" name="Дата 2">
             <a:extLst>
               <a:ext uri="{FF2B5EF4-FFF2-40B4-BE49-F238E27FC236}">
-                <a16:creationId xmlns="" xmlns:a16="http://schemas.microsoft.com/office/drawing/2014/main" id="{7A740606-3AD8-42ED-B129-A3DEC06BC505}"/>
+                <a16:creationId xmlns:a16="http://schemas.microsoft.com/office/drawing/2014/main" xmlns="" id="{7A740606-3AD8-42ED-B129-A3DEC06BC505}"/>
               </a:ext>
             </a:extLst>
           </p:cNvPr>
@@ -468,7 +468,7 @@
           <a:p>
             <a:fld id="{39985775-DA12-4519-AD4E-BF0D8B5A28A2}" type="datetimeFigureOut">
               <a:rPr lang="ru-RU" smtClean="0"/>
-              <a:t>07.12.2022</a:t>
+              <a:t>08.12.2022</a:t>
             </a:fld>
             <a:endParaRPr lang="ru-RU"/>
           </a:p>
@@ -479,7 +479,7 @@
           <p:cNvPr id="4" name="Нижний колонтитул 3">
             <a:extLst>
               <a:ext uri="{FF2B5EF4-FFF2-40B4-BE49-F238E27FC236}">
-                <a16:creationId xmlns="" xmlns:a16="http://schemas.microsoft.com/office/drawing/2014/main" id="{F47C616E-EC5D-4161-B871-4DBFA23F1B01}"/>
+                <a16:creationId xmlns:a16="http://schemas.microsoft.com/office/drawing/2014/main" xmlns="" id="{F47C616E-EC5D-4161-B871-4DBFA23F1B01}"/>
               </a:ext>
             </a:extLst>
           </p:cNvPr>
@@ -504,7 +504,7 @@
           <p:cNvPr id="5" name="Номер слайда 4">
             <a:extLst>
               <a:ext uri="{FF2B5EF4-FFF2-40B4-BE49-F238E27FC236}">
-                <a16:creationId xmlns="" xmlns:a16="http://schemas.microsoft.com/office/drawing/2014/main" id="{017A186C-6BE5-484A-94F6-B5CFB1FB3258}"/>
+                <a16:creationId xmlns:a16="http://schemas.microsoft.com/office/drawing/2014/main" xmlns="" id="{017A186C-6BE5-484A-94F6-B5CFB1FB3258}"/>
               </a:ext>
             </a:extLst>
           </p:cNvPr>
@@ -575,7 +575,7 @@
           <p:cNvPr id="2" name="Дата 1">
             <a:extLst>
               <a:ext uri="{FF2B5EF4-FFF2-40B4-BE49-F238E27FC236}">
-                <a16:creationId xmlns="" xmlns:a16="http://schemas.microsoft.com/office/drawing/2014/main" id="{84059D37-F92B-4726-A34B-164AC46F6B03}"/>
+                <a16:creationId xmlns:a16="http://schemas.microsoft.com/office/drawing/2014/main" xmlns="" id="{84059D37-F92B-4726-A34B-164AC46F6B03}"/>
               </a:ext>
             </a:extLst>
           </p:cNvPr>
@@ -593,7 +593,7 @@
           <a:p>
             <a:fld id="{39985775-DA12-4519-AD4E-BF0D8B5A28A2}" type="datetimeFigureOut">
               <a:rPr lang="ru-RU" smtClean="0"/>
-              <a:t>07.12.2022</a:t>
+              <a:t>08.12.2022</a:t>
             </a:fld>
             <a:endParaRPr lang="ru-RU"/>
           </a:p>
@@ -604,7 +604,7 @@
           <p:cNvPr id="3" name="Нижний колонтитул 2">
             <a:extLst>
               <a:ext uri="{FF2B5EF4-FFF2-40B4-BE49-F238E27FC236}">
-                <a16:creationId xmlns="" xmlns:a16="http://schemas.microsoft.com/office/drawing/2014/main" id="{5EB8A300-DCC2-4DBC-89F3-19460679B6D8}"/>
+                <a16:creationId xmlns:a16="http://schemas.microsoft.com/office/drawing/2014/main" xmlns="" id="{5EB8A300-DCC2-4DBC-89F3-19460679B6D8}"/>
               </a:ext>
             </a:extLst>
           </p:cNvPr>
@@ -629,7 +629,7 @@
           <p:cNvPr id="4" name="Номер слайда 3">
             <a:extLst>
               <a:ext uri="{FF2B5EF4-FFF2-40B4-BE49-F238E27FC236}">
-                <a16:creationId xmlns="" xmlns:a16="http://schemas.microsoft.com/office/drawing/2014/main" id="{6AE01FBC-E1B1-44CF-B5F4-B0621F58BA87}"/>
+                <a16:creationId xmlns:a16="http://schemas.microsoft.com/office/drawing/2014/main" xmlns="" id="{6AE01FBC-E1B1-44CF-B5F4-B0621F58BA87}"/>
               </a:ext>
             </a:extLst>
           </p:cNvPr>
@@ -700,7 +700,7 @@
           <p:cNvPr id="2" name="Заголовок 1">
             <a:extLst>
               <a:ext uri="{FF2B5EF4-FFF2-40B4-BE49-F238E27FC236}">
-                <a16:creationId xmlns="" xmlns:a16="http://schemas.microsoft.com/office/drawing/2014/main" id="{E0CDE81A-B789-490D-9823-1DCB79555CA7}"/>
+                <a16:creationId xmlns:a16="http://schemas.microsoft.com/office/drawing/2014/main" xmlns="" id="{E0CDE81A-B789-490D-9823-1DCB79555CA7}"/>
               </a:ext>
             </a:extLst>
           </p:cNvPr>
@@ -737,7 +737,7 @@
           <p:cNvPr id="3" name="Объект 2">
             <a:extLst>
               <a:ext uri="{FF2B5EF4-FFF2-40B4-BE49-F238E27FC236}">
-                <a16:creationId xmlns="" xmlns:a16="http://schemas.microsoft.com/office/drawing/2014/main" id="{34E3DE41-335B-4255-BD1B-1BD5FD769150}"/>
+                <a16:creationId xmlns:a16="http://schemas.microsoft.com/office/drawing/2014/main" xmlns="" id="{34E3DE41-335B-4255-BD1B-1BD5FD769150}"/>
               </a:ext>
             </a:extLst>
           </p:cNvPr>
@@ -827,7 +827,7 @@
           <p:cNvPr id="4" name="Текст 3">
             <a:extLst>
               <a:ext uri="{FF2B5EF4-FFF2-40B4-BE49-F238E27FC236}">
-                <a16:creationId xmlns="" xmlns:a16="http://schemas.microsoft.com/office/drawing/2014/main" id="{11CDC965-EE27-49DE-926C-3E4E5F353E3D}"/>
+                <a16:creationId xmlns:a16="http://schemas.microsoft.com/office/drawing/2014/main" xmlns="" id="{11CDC965-EE27-49DE-926C-3E4E5F353E3D}"/>
               </a:ext>
             </a:extLst>
           </p:cNvPr>
@@ -898,7 +898,7 @@
           <p:cNvPr id="5" name="Дата 4">
             <a:extLst>
               <a:ext uri="{FF2B5EF4-FFF2-40B4-BE49-F238E27FC236}">
-                <a16:creationId xmlns="" xmlns:a16="http://schemas.microsoft.com/office/drawing/2014/main" id="{A187F107-3B06-47AE-890B-4028A5F72270}"/>
+                <a16:creationId xmlns:a16="http://schemas.microsoft.com/office/drawing/2014/main" xmlns="" id="{A187F107-3B06-47AE-890B-4028A5F72270}"/>
               </a:ext>
             </a:extLst>
           </p:cNvPr>
@@ -916,7 +916,7 @@
           <a:p>
             <a:fld id="{39985775-DA12-4519-AD4E-BF0D8B5A28A2}" type="datetimeFigureOut">
               <a:rPr lang="ru-RU" smtClean="0"/>
-              <a:t>07.12.2022</a:t>
+              <a:t>08.12.2022</a:t>
             </a:fld>
             <a:endParaRPr lang="ru-RU"/>
           </a:p>
@@ -927,7 +927,7 @@
           <p:cNvPr id="6" name="Нижний колонтитул 5">
             <a:extLst>
               <a:ext uri="{FF2B5EF4-FFF2-40B4-BE49-F238E27FC236}">
-                <a16:creationId xmlns="" xmlns:a16="http://schemas.microsoft.com/office/drawing/2014/main" id="{24E7A224-216B-43E1-A95E-10F95BB0FD69}"/>
+                <a16:creationId xmlns:a16="http://schemas.microsoft.com/office/drawing/2014/main" xmlns="" id="{24E7A224-216B-43E1-A95E-10F95BB0FD69}"/>
               </a:ext>
             </a:extLst>
           </p:cNvPr>
@@ -952,7 +952,7 @@
           <p:cNvPr id="7" name="Номер слайда 6">
             <a:extLst>
               <a:ext uri="{FF2B5EF4-FFF2-40B4-BE49-F238E27FC236}">
-                <a16:creationId xmlns="" xmlns:a16="http://schemas.microsoft.com/office/drawing/2014/main" id="{45BF9C8F-012F-410C-9624-42ADB56B0912}"/>
+                <a16:creationId xmlns:a16="http://schemas.microsoft.com/office/drawing/2014/main" xmlns="" id="{45BF9C8F-012F-410C-9624-42ADB56B0912}"/>
               </a:ext>
             </a:extLst>
           </p:cNvPr>
@@ -1023,7 +1023,7 @@
           <p:cNvPr id="2" name="Заголовок 1">
             <a:extLst>
               <a:ext uri="{FF2B5EF4-FFF2-40B4-BE49-F238E27FC236}">
-                <a16:creationId xmlns="" xmlns:a16="http://schemas.microsoft.com/office/drawing/2014/main" id="{EB7FA0CA-376B-46DC-813B-5E5FBFAAC05E}"/>
+                <a16:creationId xmlns:a16="http://schemas.microsoft.com/office/drawing/2014/main" xmlns="" id="{EB7FA0CA-376B-46DC-813B-5E5FBFAAC05E}"/>
               </a:ext>
             </a:extLst>
           </p:cNvPr>
@@ -1060,7 +1060,7 @@
           <p:cNvPr id="3" name="Рисунок 2">
             <a:extLst>
               <a:ext uri="{FF2B5EF4-FFF2-40B4-BE49-F238E27FC236}">
-                <a16:creationId xmlns="" xmlns:a16="http://schemas.microsoft.com/office/drawing/2014/main" id="{F1EBA494-E82E-4757-A3C0-955EA65D11F7}"/>
+                <a16:creationId xmlns:a16="http://schemas.microsoft.com/office/drawing/2014/main" xmlns="" id="{F1EBA494-E82E-4757-A3C0-955EA65D11F7}"/>
               </a:ext>
             </a:extLst>
           </p:cNvPr>
@@ -1127,7 +1127,7 @@
           <p:cNvPr id="4" name="Текст 3">
             <a:extLst>
               <a:ext uri="{FF2B5EF4-FFF2-40B4-BE49-F238E27FC236}">
-                <a16:creationId xmlns="" xmlns:a16="http://schemas.microsoft.com/office/drawing/2014/main" id="{33117C38-1525-4DAA-A6A8-79732457CC95}"/>
+                <a16:creationId xmlns:a16="http://schemas.microsoft.com/office/drawing/2014/main" xmlns="" id="{33117C38-1525-4DAA-A6A8-79732457CC95}"/>
               </a:ext>
             </a:extLst>
           </p:cNvPr>
@@ -1198,7 +1198,7 @@
           <p:cNvPr id="5" name="Дата 4">
             <a:extLst>
               <a:ext uri="{FF2B5EF4-FFF2-40B4-BE49-F238E27FC236}">
-                <a16:creationId xmlns="" xmlns:a16="http://schemas.microsoft.com/office/drawing/2014/main" id="{0CF361C5-F126-4C0B-AE3A-2CBA980EFC2C}"/>
+                <a16:creationId xmlns:a16="http://schemas.microsoft.com/office/drawing/2014/main" xmlns="" id="{0CF361C5-F126-4C0B-AE3A-2CBA980EFC2C}"/>
               </a:ext>
             </a:extLst>
           </p:cNvPr>
@@ -1216,7 +1216,7 @@
           <a:p>
             <a:fld id="{39985775-DA12-4519-AD4E-BF0D8B5A28A2}" type="datetimeFigureOut">
               <a:rPr lang="ru-RU" smtClean="0"/>
-              <a:t>07.12.2022</a:t>
+              <a:t>08.12.2022</a:t>
             </a:fld>
             <a:endParaRPr lang="ru-RU"/>
           </a:p>
@@ -1227,7 +1227,7 @@
           <p:cNvPr id="6" name="Нижний колонтитул 5">
             <a:extLst>
               <a:ext uri="{FF2B5EF4-FFF2-40B4-BE49-F238E27FC236}">
-                <a16:creationId xmlns="" xmlns:a16="http://schemas.microsoft.com/office/drawing/2014/main" id="{6F4F4485-29FD-4F98-96FC-E5D8DCB98AC3}"/>
+                <a16:creationId xmlns:a16="http://schemas.microsoft.com/office/drawing/2014/main" xmlns="" id="{6F4F4485-29FD-4F98-96FC-E5D8DCB98AC3}"/>
               </a:ext>
             </a:extLst>
           </p:cNvPr>
@@ -1252,7 +1252,7 @@
           <p:cNvPr id="7" name="Номер слайда 6">
             <a:extLst>
               <a:ext uri="{FF2B5EF4-FFF2-40B4-BE49-F238E27FC236}">
-                <a16:creationId xmlns="" xmlns:a16="http://schemas.microsoft.com/office/drawing/2014/main" id="{5942FB67-03FB-449E-89B5-DF67F63DAA5F}"/>
+                <a16:creationId xmlns:a16="http://schemas.microsoft.com/office/drawing/2014/main" xmlns="" id="{5942FB67-03FB-449E-89B5-DF67F63DAA5F}"/>
               </a:ext>
             </a:extLst>
           </p:cNvPr>
@@ -1323,7 +1323,7 @@
           <p:cNvPr id="2" name="Заголовок 1">
             <a:extLst>
               <a:ext uri="{FF2B5EF4-FFF2-40B4-BE49-F238E27FC236}">
-                <a16:creationId xmlns="" xmlns:a16="http://schemas.microsoft.com/office/drawing/2014/main" id="{4575B5E7-60F9-464C-B174-D06589C576AD}"/>
+                <a16:creationId xmlns:a16="http://schemas.microsoft.com/office/drawing/2014/main" xmlns="" id="{4575B5E7-60F9-464C-B174-D06589C576AD}"/>
               </a:ext>
             </a:extLst>
           </p:cNvPr>
@@ -1351,7 +1351,7 @@
           <p:cNvPr id="3" name="Вертикальный текст 2">
             <a:extLst>
               <a:ext uri="{FF2B5EF4-FFF2-40B4-BE49-F238E27FC236}">
-                <a16:creationId xmlns="" xmlns:a16="http://schemas.microsoft.com/office/drawing/2014/main" id="{D28484D1-D333-4AE1-BBFC-CD1DEC20F3D6}"/>
+                <a16:creationId xmlns:a16="http://schemas.microsoft.com/office/drawing/2014/main" xmlns="" id="{D28484D1-D333-4AE1-BBFC-CD1DEC20F3D6}"/>
               </a:ext>
             </a:extLst>
           </p:cNvPr>
@@ -1408,7 +1408,7 @@
           <p:cNvPr id="4" name="Дата 3">
             <a:extLst>
               <a:ext uri="{FF2B5EF4-FFF2-40B4-BE49-F238E27FC236}">
-                <a16:creationId xmlns="" xmlns:a16="http://schemas.microsoft.com/office/drawing/2014/main" id="{64A59D6A-B58D-4E95-A396-200C9B9BC3C0}"/>
+                <a16:creationId xmlns:a16="http://schemas.microsoft.com/office/drawing/2014/main" xmlns="" id="{64A59D6A-B58D-4E95-A396-200C9B9BC3C0}"/>
               </a:ext>
             </a:extLst>
           </p:cNvPr>
@@ -1426,7 +1426,7 @@
           <a:p>
             <a:fld id="{39985775-DA12-4519-AD4E-BF0D8B5A28A2}" type="datetimeFigureOut">
               <a:rPr lang="ru-RU" smtClean="0"/>
-              <a:t>07.12.2022</a:t>
+              <a:t>08.12.2022</a:t>
             </a:fld>
             <a:endParaRPr lang="ru-RU"/>
           </a:p>
@@ -1437,7 +1437,7 @@
           <p:cNvPr id="5" name="Нижний колонтитул 4">
             <a:extLst>
               <a:ext uri="{FF2B5EF4-FFF2-40B4-BE49-F238E27FC236}">
-                <a16:creationId xmlns="" xmlns:a16="http://schemas.microsoft.com/office/drawing/2014/main" id="{7EB437D5-797B-49CA-AD3B-BE3CAF57E723}"/>
+                <a16:creationId xmlns:a16="http://schemas.microsoft.com/office/drawing/2014/main" xmlns="" id="{7EB437D5-797B-49CA-AD3B-BE3CAF57E723}"/>
               </a:ext>
             </a:extLst>
           </p:cNvPr>
@@ -1462,7 +1462,7 @@
           <p:cNvPr id="6" name="Номер слайда 5">
             <a:extLst>
               <a:ext uri="{FF2B5EF4-FFF2-40B4-BE49-F238E27FC236}">
-                <a16:creationId xmlns="" xmlns:a16="http://schemas.microsoft.com/office/drawing/2014/main" id="{2A1F4BFD-DCAB-4FA8-B42C-658D6832F7F0}"/>
+                <a16:creationId xmlns:a16="http://schemas.microsoft.com/office/drawing/2014/main" xmlns="" id="{2A1F4BFD-DCAB-4FA8-B42C-658D6832F7F0}"/>
               </a:ext>
             </a:extLst>
           </p:cNvPr>
@@ -1533,7 +1533,7 @@
           <p:cNvPr id="2" name="Вертикальный заголовок 1">
             <a:extLst>
               <a:ext uri="{FF2B5EF4-FFF2-40B4-BE49-F238E27FC236}">
-                <a16:creationId xmlns="" xmlns:a16="http://schemas.microsoft.com/office/drawing/2014/main" id="{0DD7D349-5ABD-40CA-91CD-9AC19B7C01AA}"/>
+                <a16:creationId xmlns:a16="http://schemas.microsoft.com/office/drawing/2014/main" xmlns="" id="{0DD7D349-5ABD-40CA-91CD-9AC19B7C01AA}"/>
               </a:ext>
             </a:extLst>
           </p:cNvPr>
@@ -1566,7 +1566,7 @@
           <p:cNvPr id="3" name="Вертикальный текст 2">
             <a:extLst>
               <a:ext uri="{FF2B5EF4-FFF2-40B4-BE49-F238E27FC236}">
-                <a16:creationId xmlns="" xmlns:a16="http://schemas.microsoft.com/office/drawing/2014/main" id="{F28E4FE5-4CB9-457C-9776-A6FC25BBA2BD}"/>
+                <a16:creationId xmlns:a16="http://schemas.microsoft.com/office/drawing/2014/main" xmlns="" id="{F28E4FE5-4CB9-457C-9776-A6FC25BBA2BD}"/>
               </a:ext>
             </a:extLst>
           </p:cNvPr>
@@ -1628,7 +1628,7 @@
           <p:cNvPr id="4" name="Дата 3">
             <a:extLst>
               <a:ext uri="{FF2B5EF4-FFF2-40B4-BE49-F238E27FC236}">
-                <a16:creationId xmlns="" xmlns:a16="http://schemas.microsoft.com/office/drawing/2014/main" id="{16DF420E-C006-48BA-ACD0-A009889F4495}"/>
+                <a16:creationId xmlns:a16="http://schemas.microsoft.com/office/drawing/2014/main" xmlns="" id="{16DF420E-C006-48BA-ACD0-A009889F4495}"/>
               </a:ext>
             </a:extLst>
           </p:cNvPr>
@@ -1646,7 +1646,7 @@
           <a:p>
             <a:fld id="{39985775-DA12-4519-AD4E-BF0D8B5A28A2}" type="datetimeFigureOut">
               <a:rPr lang="ru-RU" smtClean="0"/>
-              <a:t>07.12.2022</a:t>
+              <a:t>08.12.2022</a:t>
             </a:fld>
             <a:endParaRPr lang="ru-RU"/>
           </a:p>
@@ -1657,7 +1657,7 @@
           <p:cNvPr id="5" name="Нижний колонтитул 4">
             <a:extLst>
               <a:ext uri="{FF2B5EF4-FFF2-40B4-BE49-F238E27FC236}">
-                <a16:creationId xmlns="" xmlns:a16="http://schemas.microsoft.com/office/drawing/2014/main" id="{D36841BA-4A5C-4F80-82B2-3FE13D1DF5B3}"/>
+                <a16:creationId xmlns:a16="http://schemas.microsoft.com/office/drawing/2014/main" xmlns="" id="{D36841BA-4A5C-4F80-82B2-3FE13D1DF5B3}"/>
               </a:ext>
             </a:extLst>
           </p:cNvPr>
@@ -1682,7 +1682,7 @@
           <p:cNvPr id="6" name="Номер слайда 5">
             <a:extLst>
               <a:ext uri="{FF2B5EF4-FFF2-40B4-BE49-F238E27FC236}">
-                <a16:creationId xmlns="" xmlns:a16="http://schemas.microsoft.com/office/drawing/2014/main" id="{1B5348BA-A8D9-4752-9849-D1F480476C8F}"/>
+                <a16:creationId xmlns:a16="http://schemas.microsoft.com/office/drawing/2014/main" xmlns="" id="{1B5348BA-A8D9-4752-9849-D1F480476C8F}"/>
               </a:ext>
             </a:extLst>
           </p:cNvPr>
@@ -1753,7 +1753,7 @@
           <p:cNvPr id="2" name="Заголовок 1">
             <a:extLst>
               <a:ext uri="{FF2B5EF4-FFF2-40B4-BE49-F238E27FC236}">
-                <a16:creationId xmlns="" xmlns:a16="http://schemas.microsoft.com/office/drawing/2014/main" id="{9EC2F858-143C-49BF-AC24-DDE5A569426D}"/>
+                <a16:creationId xmlns:a16="http://schemas.microsoft.com/office/drawing/2014/main" xmlns="" id="{9EC2F858-143C-49BF-AC24-DDE5A569426D}"/>
               </a:ext>
             </a:extLst>
           </p:cNvPr>
@@ -1789,7 +1789,7 @@
           <p:cNvPr id="3" name="Объект 2">
             <a:extLst>
               <a:ext uri="{FF2B5EF4-FFF2-40B4-BE49-F238E27FC236}">
-                <a16:creationId xmlns="" xmlns:a16="http://schemas.microsoft.com/office/drawing/2014/main" id="{0CA1AEBE-8905-4864-B3FD-4CD04946E549}"/>
+                <a16:creationId xmlns:a16="http://schemas.microsoft.com/office/drawing/2014/main" xmlns="" id="{0CA1AEBE-8905-4864-B3FD-4CD04946E549}"/>
               </a:ext>
             </a:extLst>
           </p:cNvPr>
@@ -1846,7 +1846,7 @@
           <p:cNvPr id="7" name="Прямоугольник 6">
             <a:extLst>
               <a:ext uri="{FF2B5EF4-FFF2-40B4-BE49-F238E27FC236}">
-                <a16:creationId xmlns="" xmlns:a16="http://schemas.microsoft.com/office/drawing/2014/main" id="{AA079D8C-B135-4B29-9B74-4C89FD7E531F}"/>
+                <a16:creationId xmlns:a16="http://schemas.microsoft.com/office/drawing/2014/main" xmlns="" id="{AA079D8C-B135-4B29-9B74-4C89FD7E531F}"/>
               </a:ext>
             </a:extLst>
           </p:cNvPr>
@@ -1895,7 +1895,7 @@
           <p:cNvPr id="8" name="Прямоугольник 7">
             <a:extLst>
               <a:ext uri="{FF2B5EF4-FFF2-40B4-BE49-F238E27FC236}">
-                <a16:creationId xmlns="" xmlns:a16="http://schemas.microsoft.com/office/drawing/2014/main" id="{FF0D1648-B806-40EE-B6E3-7634106F579D}"/>
+                <a16:creationId xmlns:a16="http://schemas.microsoft.com/office/drawing/2014/main" xmlns="" id="{FF0D1648-B806-40EE-B6E3-7634106F579D}"/>
               </a:ext>
             </a:extLst>
           </p:cNvPr>
@@ -1944,7 +1944,7 @@
           <p:cNvPr id="10" name="Прямоугольник 9">
             <a:extLst>
               <a:ext uri="{FF2B5EF4-FFF2-40B4-BE49-F238E27FC236}">
-                <a16:creationId xmlns="" xmlns:a16="http://schemas.microsoft.com/office/drawing/2014/main" id="{9D45F2DE-3202-46E3-A4DF-1E1F8D2367F3}"/>
+                <a16:creationId xmlns:a16="http://schemas.microsoft.com/office/drawing/2014/main" xmlns="" id="{9D45F2DE-3202-46E3-A4DF-1E1F8D2367F3}"/>
               </a:ext>
             </a:extLst>
           </p:cNvPr>
@@ -1993,7 +1993,7 @@
           <p:cNvPr id="12" name="Прямоугольник 11">
             <a:extLst>
               <a:ext uri="{FF2B5EF4-FFF2-40B4-BE49-F238E27FC236}">
-                <a16:creationId xmlns="" xmlns:a16="http://schemas.microsoft.com/office/drawing/2014/main" id="{D4E4023C-83D7-4B9B-83E0-97AB0F4AC43B}"/>
+                <a16:creationId xmlns:a16="http://schemas.microsoft.com/office/drawing/2014/main" xmlns="" id="{D4E4023C-83D7-4B9B-83E0-97AB0F4AC43B}"/>
               </a:ext>
             </a:extLst>
           </p:cNvPr>
@@ -2084,7 +2084,7 @@
           <p:cNvPr id="2" name="Заголовок 1">
             <a:extLst>
               <a:ext uri="{FF2B5EF4-FFF2-40B4-BE49-F238E27FC236}">
-                <a16:creationId xmlns="" xmlns:a16="http://schemas.microsoft.com/office/drawing/2014/main" id="{9EC2F858-143C-49BF-AC24-DDE5A569426D}"/>
+                <a16:creationId xmlns:a16="http://schemas.microsoft.com/office/drawing/2014/main" xmlns="" id="{9EC2F858-143C-49BF-AC24-DDE5A569426D}"/>
               </a:ext>
             </a:extLst>
           </p:cNvPr>
@@ -2125,7 +2125,7 @@
           <p:cNvPr id="3" name="Объект 2">
             <a:extLst>
               <a:ext uri="{FF2B5EF4-FFF2-40B4-BE49-F238E27FC236}">
-                <a16:creationId xmlns="" xmlns:a16="http://schemas.microsoft.com/office/drawing/2014/main" id="{0CA1AEBE-8905-4864-B3FD-4CD04946E549}"/>
+                <a16:creationId xmlns:a16="http://schemas.microsoft.com/office/drawing/2014/main" xmlns="" id="{0CA1AEBE-8905-4864-B3FD-4CD04946E549}"/>
               </a:ext>
             </a:extLst>
           </p:cNvPr>
@@ -2187,7 +2187,7 @@
           <p:cNvPr id="5" name="Рисунок 4">
             <a:extLst>
               <a:ext uri="{FF2B5EF4-FFF2-40B4-BE49-F238E27FC236}">
-                <a16:creationId xmlns="" xmlns:a16="http://schemas.microsoft.com/office/drawing/2014/main" id="{8B632DE5-F5F2-4462-94DA-690026333B02}"/>
+                <a16:creationId xmlns:a16="http://schemas.microsoft.com/office/drawing/2014/main" xmlns="" id="{8B632DE5-F5F2-4462-94DA-690026333B02}"/>
               </a:ext>
             </a:extLst>
           </p:cNvPr>
@@ -2259,7 +2259,7 @@
           <p:cNvPr id="8" name="Прямоугольник 7">
             <a:extLst>
               <a:ext uri="{FF2B5EF4-FFF2-40B4-BE49-F238E27FC236}">
-                <a16:creationId xmlns="" xmlns:a16="http://schemas.microsoft.com/office/drawing/2014/main" id="{81134973-9603-4EB5-B737-91F29D4CD883}"/>
+                <a16:creationId xmlns:a16="http://schemas.microsoft.com/office/drawing/2014/main" xmlns="" id="{81134973-9603-4EB5-B737-91F29D4CD883}"/>
               </a:ext>
             </a:extLst>
           </p:cNvPr>
@@ -2311,7 +2311,7 @@
           <p:cNvPr id="2" name="Заголовок 1">
             <a:extLst>
               <a:ext uri="{FF2B5EF4-FFF2-40B4-BE49-F238E27FC236}">
-                <a16:creationId xmlns="" xmlns:a16="http://schemas.microsoft.com/office/drawing/2014/main" id="{08AAAB7C-7C1B-4105-BE24-F811EBB4014F}"/>
+                <a16:creationId xmlns:a16="http://schemas.microsoft.com/office/drawing/2014/main" xmlns="" id="{08AAAB7C-7C1B-4105-BE24-F811EBB4014F}"/>
               </a:ext>
             </a:extLst>
           </p:cNvPr>
@@ -2347,7 +2347,7 @@
           <p:cNvPr id="4" name="Дата 3">
             <a:extLst>
               <a:ext uri="{FF2B5EF4-FFF2-40B4-BE49-F238E27FC236}">
-                <a16:creationId xmlns="" xmlns:a16="http://schemas.microsoft.com/office/drawing/2014/main" id="{1AECA37A-4894-4A33-9EBE-8B2E35025896}"/>
+                <a16:creationId xmlns:a16="http://schemas.microsoft.com/office/drawing/2014/main" xmlns="" id="{1AECA37A-4894-4A33-9EBE-8B2E35025896}"/>
               </a:ext>
             </a:extLst>
           </p:cNvPr>
@@ -2365,7 +2365,7 @@
           <a:p>
             <a:fld id="{A3A83A43-64E5-4616-89E6-626296516E98}" type="datetimeFigureOut">
               <a:rPr lang="ru-RU" smtClean="0"/>
-              <a:t>07.12.2022</a:t>
+              <a:t>08.12.2022</a:t>
             </a:fld>
             <a:endParaRPr lang="ru-RU"/>
           </a:p>
@@ -2376,7 +2376,7 @@
           <p:cNvPr id="5" name="Нижний колонтитул 4">
             <a:extLst>
               <a:ext uri="{FF2B5EF4-FFF2-40B4-BE49-F238E27FC236}">
-                <a16:creationId xmlns="" xmlns:a16="http://schemas.microsoft.com/office/drawing/2014/main" id="{0230E9E2-71FB-4D16-B449-EA5254AC7A43}"/>
+                <a16:creationId xmlns:a16="http://schemas.microsoft.com/office/drawing/2014/main" xmlns="" id="{0230E9E2-71FB-4D16-B449-EA5254AC7A43}"/>
               </a:ext>
             </a:extLst>
           </p:cNvPr>
@@ -2401,7 +2401,7 @@
           <p:cNvPr id="6" name="Номер слайда 5">
             <a:extLst>
               <a:ext uri="{FF2B5EF4-FFF2-40B4-BE49-F238E27FC236}">
-                <a16:creationId xmlns="" xmlns:a16="http://schemas.microsoft.com/office/drawing/2014/main" id="{6FF10A82-3FA8-48BC-A562-4BDCC940C256}"/>
+                <a16:creationId xmlns:a16="http://schemas.microsoft.com/office/drawing/2014/main" xmlns="" id="{6FF10A82-3FA8-48BC-A562-4BDCC940C256}"/>
               </a:ext>
             </a:extLst>
           </p:cNvPr>
@@ -2430,7 +2430,7 @@
           <p:cNvPr id="10" name="Рисунок 9">
             <a:extLst>
               <a:ext uri="{FF2B5EF4-FFF2-40B4-BE49-F238E27FC236}">
-                <a16:creationId xmlns="" xmlns:a16="http://schemas.microsoft.com/office/drawing/2014/main" id="{F0D9FAC9-46ED-4B2F-8516-B63FF2354312}"/>
+                <a16:creationId xmlns:a16="http://schemas.microsoft.com/office/drawing/2014/main" xmlns="" id="{F0D9FAC9-46ED-4B2F-8516-B63FF2354312}"/>
               </a:ext>
             </a:extLst>
           </p:cNvPr>
@@ -2460,7 +2460,7 @@
           <p:cNvPr id="21" name="Текст 14">
             <a:extLst>
               <a:ext uri="{FF2B5EF4-FFF2-40B4-BE49-F238E27FC236}">
-                <a16:creationId xmlns="" xmlns:a16="http://schemas.microsoft.com/office/drawing/2014/main" id="{4413139B-1729-455B-B830-4DAB12D9B25E}"/>
+                <a16:creationId xmlns:a16="http://schemas.microsoft.com/office/drawing/2014/main" xmlns="" id="{4413139B-1729-455B-B830-4DAB12D9B25E}"/>
               </a:ext>
             </a:extLst>
           </p:cNvPr>
@@ -2522,7 +2522,7 @@
           <p:cNvPr id="22" name="Текст 14">
             <a:extLst>
               <a:ext uri="{FF2B5EF4-FFF2-40B4-BE49-F238E27FC236}">
-                <a16:creationId xmlns="" xmlns:a16="http://schemas.microsoft.com/office/drawing/2014/main" id="{222B09F7-7246-4274-A513-9BEACBF61E15}"/>
+                <a16:creationId xmlns:a16="http://schemas.microsoft.com/office/drawing/2014/main" xmlns="" id="{222B09F7-7246-4274-A513-9BEACBF61E15}"/>
               </a:ext>
             </a:extLst>
           </p:cNvPr>
@@ -2584,7 +2584,7 @@
           <p:cNvPr id="12" name="Рисунок 9">
             <a:extLst>
               <a:ext uri="{FF2B5EF4-FFF2-40B4-BE49-F238E27FC236}">
-                <a16:creationId xmlns="" xmlns:a16="http://schemas.microsoft.com/office/drawing/2014/main" id="{4B61BE1B-0619-47D5-8D00-1DBE9B7F40BF}"/>
+                <a16:creationId xmlns:a16="http://schemas.microsoft.com/office/drawing/2014/main" xmlns="" id="{4B61BE1B-0619-47D5-8D00-1DBE9B7F40BF}"/>
               </a:ext>
             </a:extLst>
           </p:cNvPr>
@@ -2656,7 +2656,7 @@
           <p:cNvPr id="2" name="Заголовок 1">
             <a:extLst>
               <a:ext uri="{FF2B5EF4-FFF2-40B4-BE49-F238E27FC236}">
-                <a16:creationId xmlns="" xmlns:a16="http://schemas.microsoft.com/office/drawing/2014/main" id="{2914E300-70A9-4046-B13A-C580CDF0889A}"/>
+                <a16:creationId xmlns:a16="http://schemas.microsoft.com/office/drawing/2014/main" xmlns="" id="{2914E300-70A9-4046-B13A-C580CDF0889A}"/>
               </a:ext>
             </a:extLst>
           </p:cNvPr>
@@ -2692,7 +2692,7 @@
           <p:cNvPr id="3" name="Дата 2">
             <a:extLst>
               <a:ext uri="{FF2B5EF4-FFF2-40B4-BE49-F238E27FC236}">
-                <a16:creationId xmlns="" xmlns:a16="http://schemas.microsoft.com/office/drawing/2014/main" id="{E2941CF8-4508-43CA-BA33-C0B9ED75329D}"/>
+                <a16:creationId xmlns:a16="http://schemas.microsoft.com/office/drawing/2014/main" xmlns="" id="{E2941CF8-4508-43CA-BA33-C0B9ED75329D}"/>
               </a:ext>
             </a:extLst>
           </p:cNvPr>
@@ -2710,7 +2710,7 @@
           <a:p>
             <a:fld id="{39985775-DA12-4519-AD4E-BF0D8B5A28A2}" type="datetimeFigureOut">
               <a:rPr lang="ru-RU" smtClean="0"/>
-              <a:t>07.12.2022</a:t>
+              <a:t>08.12.2022</a:t>
             </a:fld>
             <a:endParaRPr lang="ru-RU"/>
           </a:p>
@@ -2721,7 +2721,7 @@
           <p:cNvPr id="4" name="Нижний колонтитул 3">
             <a:extLst>
               <a:ext uri="{FF2B5EF4-FFF2-40B4-BE49-F238E27FC236}">
-                <a16:creationId xmlns="" xmlns:a16="http://schemas.microsoft.com/office/drawing/2014/main" id="{2F7B9934-7384-4A83-8B0E-FFF486DDFC47}"/>
+                <a16:creationId xmlns:a16="http://schemas.microsoft.com/office/drawing/2014/main" xmlns="" id="{2F7B9934-7384-4A83-8B0E-FFF486DDFC47}"/>
               </a:ext>
             </a:extLst>
           </p:cNvPr>
@@ -2746,7 +2746,7 @@
           <p:cNvPr id="5" name="Номер слайда 4">
             <a:extLst>
               <a:ext uri="{FF2B5EF4-FFF2-40B4-BE49-F238E27FC236}">
-                <a16:creationId xmlns="" xmlns:a16="http://schemas.microsoft.com/office/drawing/2014/main" id="{A4F36D14-7448-4ACB-B1EC-DDDAAA955198}"/>
+                <a16:creationId xmlns:a16="http://schemas.microsoft.com/office/drawing/2014/main" xmlns="" id="{A4F36D14-7448-4ACB-B1EC-DDDAAA955198}"/>
               </a:ext>
             </a:extLst>
           </p:cNvPr>
@@ -2817,7 +2817,7 @@
           <p:cNvPr id="2" name="Заголовок 1">
             <a:extLst>
               <a:ext uri="{FF2B5EF4-FFF2-40B4-BE49-F238E27FC236}">
-                <a16:creationId xmlns="" xmlns:a16="http://schemas.microsoft.com/office/drawing/2014/main" id="{9EC2F858-143C-49BF-AC24-DDE5A569426D}"/>
+                <a16:creationId xmlns:a16="http://schemas.microsoft.com/office/drawing/2014/main" xmlns="" id="{9EC2F858-143C-49BF-AC24-DDE5A569426D}"/>
               </a:ext>
             </a:extLst>
           </p:cNvPr>
@@ -2845,7 +2845,7 @@
           <p:cNvPr id="3" name="Объект 2">
             <a:extLst>
               <a:ext uri="{FF2B5EF4-FFF2-40B4-BE49-F238E27FC236}">
-                <a16:creationId xmlns="" xmlns:a16="http://schemas.microsoft.com/office/drawing/2014/main" id="{0CA1AEBE-8905-4864-B3FD-4CD04946E549}"/>
+                <a16:creationId xmlns:a16="http://schemas.microsoft.com/office/drawing/2014/main" xmlns="" id="{0CA1AEBE-8905-4864-B3FD-4CD04946E549}"/>
               </a:ext>
             </a:extLst>
           </p:cNvPr>
@@ -2944,7 +2944,7 @@
           <p:cNvPr id="2" name="Заголовок 1">
             <a:extLst>
               <a:ext uri="{FF2B5EF4-FFF2-40B4-BE49-F238E27FC236}">
-                <a16:creationId xmlns="" xmlns:a16="http://schemas.microsoft.com/office/drawing/2014/main" id="{1D6F616B-C814-43CB-9D66-2ACCE175F2AB}"/>
+                <a16:creationId xmlns:a16="http://schemas.microsoft.com/office/drawing/2014/main" xmlns="" id="{1D6F616B-C814-43CB-9D66-2ACCE175F2AB}"/>
               </a:ext>
             </a:extLst>
           </p:cNvPr>
@@ -2981,7 +2981,7 @@
           <p:cNvPr id="3" name="Текст 2">
             <a:extLst>
               <a:ext uri="{FF2B5EF4-FFF2-40B4-BE49-F238E27FC236}">
-                <a16:creationId xmlns="" xmlns:a16="http://schemas.microsoft.com/office/drawing/2014/main" id="{48AE93A1-6738-46E4-8F22-EE921A983948}"/>
+                <a16:creationId xmlns:a16="http://schemas.microsoft.com/office/drawing/2014/main" xmlns="" id="{48AE93A1-6738-46E4-8F22-EE921A983948}"/>
               </a:ext>
             </a:extLst>
           </p:cNvPr>
@@ -3106,7 +3106,7 @@
           <p:cNvPr id="4" name="Дата 3">
             <a:extLst>
               <a:ext uri="{FF2B5EF4-FFF2-40B4-BE49-F238E27FC236}">
-                <a16:creationId xmlns="" xmlns:a16="http://schemas.microsoft.com/office/drawing/2014/main" id="{6C78392C-C9F7-4DEF-AA81-542C2AAC75D8}"/>
+                <a16:creationId xmlns:a16="http://schemas.microsoft.com/office/drawing/2014/main" xmlns="" id="{6C78392C-C9F7-4DEF-AA81-542C2AAC75D8}"/>
               </a:ext>
             </a:extLst>
           </p:cNvPr>
@@ -3124,7 +3124,7 @@
           <a:p>
             <a:fld id="{39985775-DA12-4519-AD4E-BF0D8B5A28A2}" type="datetimeFigureOut">
               <a:rPr lang="ru-RU" smtClean="0"/>
-              <a:t>07.12.2022</a:t>
+              <a:t>08.12.2022</a:t>
             </a:fld>
             <a:endParaRPr lang="ru-RU"/>
           </a:p>
@@ -3135,7 +3135,7 @@
           <p:cNvPr id="5" name="Нижний колонтитул 4">
             <a:extLst>
               <a:ext uri="{FF2B5EF4-FFF2-40B4-BE49-F238E27FC236}">
-                <a16:creationId xmlns="" xmlns:a16="http://schemas.microsoft.com/office/drawing/2014/main" id="{A00A34EB-7EF1-4575-A605-E6075A6358F8}"/>
+                <a16:creationId xmlns:a16="http://schemas.microsoft.com/office/drawing/2014/main" xmlns="" id="{A00A34EB-7EF1-4575-A605-E6075A6358F8}"/>
               </a:ext>
             </a:extLst>
           </p:cNvPr>
@@ -3160,7 +3160,7 @@
           <p:cNvPr id="6" name="Номер слайда 5">
             <a:extLst>
               <a:ext uri="{FF2B5EF4-FFF2-40B4-BE49-F238E27FC236}">
-                <a16:creationId xmlns="" xmlns:a16="http://schemas.microsoft.com/office/drawing/2014/main" id="{B1F6B72C-E973-4717-9B32-EB861DCB2EF5}"/>
+                <a16:creationId xmlns:a16="http://schemas.microsoft.com/office/drawing/2014/main" xmlns="" id="{B1F6B72C-E973-4717-9B32-EB861DCB2EF5}"/>
               </a:ext>
             </a:extLst>
           </p:cNvPr>
@@ -3231,7 +3231,7 @@
           <p:cNvPr id="2" name="Заголовок 1">
             <a:extLst>
               <a:ext uri="{FF2B5EF4-FFF2-40B4-BE49-F238E27FC236}">
-                <a16:creationId xmlns="" xmlns:a16="http://schemas.microsoft.com/office/drawing/2014/main" id="{C09AC03E-CC96-46B4-8F06-809941B60B78}"/>
+                <a16:creationId xmlns:a16="http://schemas.microsoft.com/office/drawing/2014/main" xmlns="" id="{C09AC03E-CC96-46B4-8F06-809941B60B78}"/>
               </a:ext>
             </a:extLst>
           </p:cNvPr>
@@ -3259,7 +3259,7 @@
           <p:cNvPr id="3" name="Объект 2">
             <a:extLst>
               <a:ext uri="{FF2B5EF4-FFF2-40B4-BE49-F238E27FC236}">
-                <a16:creationId xmlns="" xmlns:a16="http://schemas.microsoft.com/office/drawing/2014/main" id="{AED83CB0-A9EB-4FCC-AFF1-9C0719455B37}"/>
+                <a16:creationId xmlns:a16="http://schemas.microsoft.com/office/drawing/2014/main" xmlns="" id="{AED83CB0-A9EB-4FCC-AFF1-9C0719455B37}"/>
               </a:ext>
             </a:extLst>
           </p:cNvPr>
@@ -3321,7 +3321,7 @@
           <p:cNvPr id="4" name="Объект 3">
             <a:extLst>
               <a:ext uri="{FF2B5EF4-FFF2-40B4-BE49-F238E27FC236}">
-                <a16:creationId xmlns="" xmlns:a16="http://schemas.microsoft.com/office/drawing/2014/main" id="{F2A519CA-8C32-464E-AB8C-C7DAE493BF57}"/>
+                <a16:creationId xmlns:a16="http://schemas.microsoft.com/office/drawing/2014/main" xmlns="" id="{F2A519CA-8C32-464E-AB8C-C7DAE493BF57}"/>
               </a:ext>
             </a:extLst>
           </p:cNvPr>
@@ -3383,7 +3383,7 @@
           <p:cNvPr id="5" name="Дата 4">
             <a:extLst>
               <a:ext uri="{FF2B5EF4-FFF2-40B4-BE49-F238E27FC236}">
-                <a16:creationId xmlns="" xmlns:a16="http://schemas.microsoft.com/office/drawing/2014/main" id="{59389CDC-954B-4F3C-8708-20D835E735D8}"/>
+                <a16:creationId xmlns:a16="http://schemas.microsoft.com/office/drawing/2014/main" xmlns="" id="{59389CDC-954B-4F3C-8708-20D835E735D8}"/>
               </a:ext>
             </a:extLst>
           </p:cNvPr>
@@ -3401,7 +3401,7 @@
           <a:p>
             <a:fld id="{39985775-DA12-4519-AD4E-BF0D8B5A28A2}" type="datetimeFigureOut">
               <a:rPr lang="ru-RU" smtClean="0"/>
-              <a:t>07.12.2022</a:t>
+              <a:t>08.12.2022</a:t>
             </a:fld>
             <a:endParaRPr lang="ru-RU"/>
           </a:p>
@@ -3412,7 +3412,7 @@
           <p:cNvPr id="6" name="Нижний колонтитул 5">
             <a:extLst>
               <a:ext uri="{FF2B5EF4-FFF2-40B4-BE49-F238E27FC236}">
-                <a16:creationId xmlns="" xmlns:a16="http://schemas.microsoft.com/office/drawing/2014/main" id="{9021DA71-9B62-4B5B-9FC5-8A2FE4CE5A21}"/>
+                <a16:creationId xmlns:a16="http://schemas.microsoft.com/office/drawing/2014/main" xmlns="" id="{9021DA71-9B62-4B5B-9FC5-8A2FE4CE5A21}"/>
               </a:ext>
             </a:extLst>
           </p:cNvPr>
@@ -3437,7 +3437,7 @@
           <p:cNvPr id="7" name="Номер слайда 6">
             <a:extLst>
               <a:ext uri="{FF2B5EF4-FFF2-40B4-BE49-F238E27FC236}">
-                <a16:creationId xmlns="" xmlns:a16="http://schemas.microsoft.com/office/drawing/2014/main" id="{9BC5407C-33E1-4753-B9AC-F00DBA80868C}"/>
+                <a16:creationId xmlns:a16="http://schemas.microsoft.com/office/drawing/2014/main" xmlns="" id="{9BC5407C-33E1-4753-B9AC-F00DBA80868C}"/>
               </a:ext>
             </a:extLst>
           </p:cNvPr>
@@ -3508,7 +3508,7 @@
           <p:cNvPr id="2" name="Заголовок 1">
             <a:extLst>
               <a:ext uri="{FF2B5EF4-FFF2-40B4-BE49-F238E27FC236}">
-                <a16:creationId xmlns="" xmlns:a16="http://schemas.microsoft.com/office/drawing/2014/main" id="{CD663584-63A5-4369-B563-05FB35552DB9}"/>
+                <a16:creationId xmlns:a16="http://schemas.microsoft.com/office/drawing/2014/main" xmlns="" id="{CD663584-63A5-4369-B563-05FB35552DB9}"/>
               </a:ext>
             </a:extLst>
           </p:cNvPr>
@@ -3541,7 +3541,7 @@
           <p:cNvPr id="3" name="Текст 2">
             <a:extLst>
               <a:ext uri="{FF2B5EF4-FFF2-40B4-BE49-F238E27FC236}">
-                <a16:creationId xmlns="" xmlns:a16="http://schemas.microsoft.com/office/drawing/2014/main" id="{438BDB9A-93BD-4EBA-9434-1716F89768E0}"/>
+                <a16:creationId xmlns:a16="http://schemas.microsoft.com/office/drawing/2014/main" xmlns="" id="{438BDB9A-93BD-4EBA-9434-1716F89768E0}"/>
               </a:ext>
             </a:extLst>
           </p:cNvPr>
@@ -3612,7 +3612,7 @@
           <p:cNvPr id="4" name="Объект 3">
             <a:extLst>
               <a:ext uri="{FF2B5EF4-FFF2-40B4-BE49-F238E27FC236}">
-                <a16:creationId xmlns="" xmlns:a16="http://schemas.microsoft.com/office/drawing/2014/main" id="{9C6B4D10-58E3-4843-B773-ACE304291F32}"/>
+                <a16:creationId xmlns:a16="http://schemas.microsoft.com/office/drawing/2014/main" xmlns="" id="{9C6B4D10-58E3-4843-B773-ACE304291F32}"/>
               </a:ext>
             </a:extLst>
           </p:cNvPr>
@@ -3674,7 +3674,7 @@
           <p:cNvPr id="5" name="Текст 4">
             <a:extLst>
               <a:ext uri="{FF2B5EF4-FFF2-40B4-BE49-F238E27FC236}">
-                <a16:creationId xmlns="" xmlns:a16="http://schemas.microsoft.com/office/drawing/2014/main" id="{DF791276-15DC-4AAA-A29A-7294AAED5151}"/>
+                <a16:creationId xmlns:a16="http://schemas.microsoft.com/office/drawing/2014/main" xmlns="" id="{DF791276-15DC-4AAA-A29A-7294AAED5151}"/>
               </a:ext>
             </a:extLst>
           </p:cNvPr>
@@ -3745,7 +3745,7 @@
           <p:cNvPr id="6" name="Объект 5">
             <a:extLst>
               <a:ext uri="{FF2B5EF4-FFF2-40B4-BE49-F238E27FC236}">
-                <a16:creationId xmlns="" xmlns:a16="http://schemas.microsoft.com/office/drawing/2014/main" id="{D984DE98-0C02-460E-AEB8-1FFCF6EE593F}"/>
+                <a16:creationId xmlns:a16="http://schemas.microsoft.com/office/drawing/2014/main" xmlns="" id="{D984DE98-0C02-460E-AEB8-1FFCF6EE593F}"/>
               </a:ext>
             </a:extLst>
           </p:cNvPr>
@@ -3807,7 +3807,7 @@
           <p:cNvPr id="7" name="Дата 6">
             <a:extLst>
               <a:ext uri="{FF2B5EF4-FFF2-40B4-BE49-F238E27FC236}">
-                <a16:creationId xmlns="" xmlns:a16="http://schemas.microsoft.com/office/drawing/2014/main" id="{4AE545B8-BE5D-416A-A9C4-DD942138351A}"/>
+                <a16:creationId xmlns:a16="http://schemas.microsoft.com/office/drawing/2014/main" xmlns="" id="{4AE545B8-BE5D-416A-A9C4-DD942138351A}"/>
               </a:ext>
             </a:extLst>
           </p:cNvPr>
@@ -3825,7 +3825,7 @@
           <a:p>
             <a:fld id="{39985775-DA12-4519-AD4E-BF0D8B5A28A2}" type="datetimeFigureOut">
               <a:rPr lang="ru-RU" smtClean="0"/>
-              <a:t>07.12.2022</a:t>
+              <a:t>08.12.2022</a:t>
             </a:fld>
             <a:endParaRPr lang="ru-RU"/>
           </a:p>
@@ -3836,7 +3836,7 @@
           <p:cNvPr id="8" name="Нижний колонтитул 7">
             <a:extLst>
               <a:ext uri="{FF2B5EF4-FFF2-40B4-BE49-F238E27FC236}">
-                <a16:creationId xmlns="" xmlns:a16="http://schemas.microsoft.com/office/drawing/2014/main" id="{203D84F0-63EB-4F1F-A304-21FC5773031A}"/>
+                <a16:creationId xmlns:a16="http://schemas.microsoft.com/office/drawing/2014/main" xmlns="" id="{203D84F0-63EB-4F1F-A304-21FC5773031A}"/>
               </a:ext>
             </a:extLst>
           </p:cNvPr>
@@ -3861,7 +3861,7 @@
           <p:cNvPr id="9" name="Номер слайда 8">
             <a:extLst>
               <a:ext uri="{FF2B5EF4-FFF2-40B4-BE49-F238E27FC236}">
-                <a16:creationId xmlns="" xmlns:a16="http://schemas.microsoft.com/office/drawing/2014/main" id="{56BA2A66-252D-4BBD-AD7E-3C84EC9585AC}"/>
+                <a16:creationId xmlns:a16="http://schemas.microsoft.com/office/drawing/2014/main" xmlns="" id="{56BA2A66-252D-4BBD-AD7E-3C84EC9585AC}"/>
               </a:ext>
             </a:extLst>
           </p:cNvPr>
@@ -3937,7 +3937,7 @@
           <p:cNvPr id="2" name="Заголовок 1">
             <a:extLst>
               <a:ext uri="{FF2B5EF4-FFF2-40B4-BE49-F238E27FC236}">
-                <a16:creationId xmlns="" xmlns:a16="http://schemas.microsoft.com/office/drawing/2014/main" id="{D5569195-B136-450A-9EBB-E4D32554B9F7}"/>
+                <a16:creationId xmlns:a16="http://schemas.microsoft.com/office/drawing/2014/main" xmlns="" id="{D5569195-B136-450A-9EBB-E4D32554B9F7}"/>
               </a:ext>
             </a:extLst>
           </p:cNvPr>
@@ -3975,7 +3975,7 @@
           <p:cNvPr id="3" name="Текст 2">
             <a:extLst>
               <a:ext uri="{FF2B5EF4-FFF2-40B4-BE49-F238E27FC236}">
-                <a16:creationId xmlns="" xmlns:a16="http://schemas.microsoft.com/office/drawing/2014/main" id="{6C56AFD3-762E-431D-8169-48E9431F222C}"/>
+                <a16:creationId xmlns:a16="http://schemas.microsoft.com/office/drawing/2014/main" xmlns="" id="{6C56AFD3-762E-431D-8169-48E9431F222C}"/>
               </a:ext>
             </a:extLst>
           </p:cNvPr>
@@ -4042,7 +4042,7 @@
           <p:cNvPr id="4" name="Дата 3">
             <a:extLst>
               <a:ext uri="{FF2B5EF4-FFF2-40B4-BE49-F238E27FC236}">
-                <a16:creationId xmlns="" xmlns:a16="http://schemas.microsoft.com/office/drawing/2014/main" id="{B0B0A7F1-90CF-4B8D-9FE0-9796384F4054}"/>
+                <a16:creationId xmlns:a16="http://schemas.microsoft.com/office/drawing/2014/main" xmlns="" id="{B0B0A7F1-90CF-4B8D-9FE0-9796384F4054}"/>
               </a:ext>
             </a:extLst>
           </p:cNvPr>
@@ -4078,7 +4078,7 @@
           <a:p>
             <a:fld id="{39985775-DA12-4519-AD4E-BF0D8B5A28A2}" type="datetimeFigureOut">
               <a:rPr lang="ru-RU" smtClean="0"/>
-              <a:t>07.12.2022</a:t>
+              <a:t>08.12.2022</a:t>
             </a:fld>
             <a:endParaRPr lang="ru-RU"/>
           </a:p>
@@ -4089,7 +4089,7 @@
           <p:cNvPr id="5" name="Нижний колонтитул 4">
             <a:extLst>
               <a:ext uri="{FF2B5EF4-FFF2-40B4-BE49-F238E27FC236}">
-                <a16:creationId xmlns="" xmlns:a16="http://schemas.microsoft.com/office/drawing/2014/main" id="{722E4D6C-F1D3-4A14-8D0D-B4CCD0AC81E3}"/>
+                <a16:creationId xmlns:a16="http://schemas.microsoft.com/office/drawing/2014/main" xmlns="" id="{722E4D6C-F1D3-4A14-8D0D-B4CCD0AC81E3}"/>
               </a:ext>
             </a:extLst>
           </p:cNvPr>
@@ -4132,7 +4132,7 @@
           <p:cNvPr id="6" name="Номер слайда 5">
             <a:extLst>
               <a:ext uri="{FF2B5EF4-FFF2-40B4-BE49-F238E27FC236}">
-                <a16:creationId xmlns="" xmlns:a16="http://schemas.microsoft.com/office/drawing/2014/main" id="{EDACE525-741D-45DF-830F-DE1754B0747D}"/>
+                <a16:creationId xmlns:a16="http://schemas.microsoft.com/office/drawing/2014/main" xmlns="" id="{EDACE525-741D-45DF-830F-DE1754B0747D}"/>
               </a:ext>
             </a:extLst>
           </p:cNvPr>
@@ -4180,7 +4180,7 @@
             <a:hlinkClick r:id="rId17"/>
             <a:extLst>
               <a:ext uri="{FF2B5EF4-FFF2-40B4-BE49-F238E27FC236}">
-                <a16:creationId xmlns="" xmlns:a16="http://schemas.microsoft.com/office/drawing/2014/main" id="{5B02C175-E080-45D1-9C7B-D1AA06E5A429}"/>
+                <a16:creationId xmlns:a16="http://schemas.microsoft.com/office/drawing/2014/main" xmlns="" id="{5B02C175-E080-45D1-9C7B-D1AA06E5A429}"/>
               </a:ext>
             </a:extLst>
           </p:cNvPr>
@@ -4553,7 +4553,7 @@
           <p:cNvPr id="4" name="Прямоугольник 3">
             <a:extLst>
               <a:ext uri="{FF2B5EF4-FFF2-40B4-BE49-F238E27FC236}">
-                <a16:creationId xmlns="" xmlns:a16="http://schemas.microsoft.com/office/drawing/2014/main" id="{3A24C834-B741-4195-B095-CF0589AF7461}"/>
+                <a16:creationId xmlns:a16="http://schemas.microsoft.com/office/drawing/2014/main" xmlns="" id="{3A24C834-B741-4195-B095-CF0589AF7461}"/>
               </a:ext>
             </a:extLst>
           </p:cNvPr>
@@ -4604,11 +4604,7 @@
             </a:r>
             <a:r>
               <a:rPr lang="ru-RU" sz="2000" dirty="0" smtClean="0"/>
-              <a:t>«Вычислительные средства </a:t>
-            </a:r>
-            <a:r>
-              <a:rPr lang="ru-RU" sz="2000" dirty="0" smtClean="0"/>
-              <a:t>АСОИ»</a:t>
+              <a:t>«Вычислительные средства АСОИ»</a:t>
             </a:r>
             <a:endParaRPr lang="ru-RU" sz="2000" dirty="0"/>
           </a:p>
@@ -4650,7 +4646,7 @@
           <p:cNvPr id="2" name="Заголовок 1">
             <a:extLst>
               <a:ext uri="{FF2B5EF4-FFF2-40B4-BE49-F238E27FC236}">
-                <a16:creationId xmlns="" xmlns:a16="http://schemas.microsoft.com/office/drawing/2014/main" id="{863F741A-A27B-4CE2-B7D3-79591874A84A}"/>
+                <a16:creationId xmlns:a16="http://schemas.microsoft.com/office/drawing/2014/main" xmlns="" id="{863F741A-A27B-4CE2-B7D3-79591874A84A}"/>
               </a:ext>
             </a:extLst>
           </p:cNvPr>
@@ -4694,7 +4690,7 @@
           <p:cNvPr id="3" name="Подзаголовок 2">
             <a:extLst>
               <a:ext uri="{FF2B5EF4-FFF2-40B4-BE49-F238E27FC236}">
-                <a16:creationId xmlns="" xmlns:a16="http://schemas.microsoft.com/office/drawing/2014/main" id="{5C2BA5F0-712E-441B-8DC7-1A2DEE33DD3D}"/>
+                <a16:creationId xmlns:a16="http://schemas.microsoft.com/office/drawing/2014/main" xmlns="" id="{5C2BA5F0-712E-441B-8DC7-1A2DEE33DD3D}"/>
               </a:ext>
             </a:extLst>
           </p:cNvPr>
@@ -4738,7 +4734,7 @@
           <p:cNvPr id="6" name="Прямая соединительная линия 5">
             <a:extLst>
               <a:ext uri="{FF2B5EF4-FFF2-40B4-BE49-F238E27FC236}">
-                <a16:creationId xmlns="" xmlns:a16="http://schemas.microsoft.com/office/drawing/2014/main" id="{38D3D184-4321-4E38-BE07-42489AB6216D}"/>
+                <a16:creationId xmlns:a16="http://schemas.microsoft.com/office/drawing/2014/main" xmlns="" id="{38D3D184-4321-4E38-BE07-42489AB6216D}"/>
               </a:ext>
             </a:extLst>
           </p:cNvPr>
@@ -4781,7 +4777,7 @@
           <p:cNvPr id="8" name="Прямая соединительная линия 7">
             <a:extLst>
               <a:ext uri="{FF2B5EF4-FFF2-40B4-BE49-F238E27FC236}">
-                <a16:creationId xmlns="" xmlns:a16="http://schemas.microsoft.com/office/drawing/2014/main" id="{D6A11B4B-69CF-4A51-9644-617C8A15784E}"/>
+                <a16:creationId xmlns:a16="http://schemas.microsoft.com/office/drawing/2014/main" xmlns="" id="{D6A11B4B-69CF-4A51-9644-617C8A15784E}"/>
               </a:ext>
             </a:extLst>
           </p:cNvPr>
@@ -4873,7 +4869,7 @@
           <p:cNvPr id="27" name="Прямоугольник 26">
             <a:extLst>
               <a:ext uri="{FF2B5EF4-FFF2-40B4-BE49-F238E27FC236}">
-                <a16:creationId xmlns="" xmlns:a16="http://schemas.microsoft.com/office/drawing/2014/main" id="{6AB6FD9A-1AFC-4807-9449-71974F4B8494}"/>
+                <a16:creationId xmlns:a16="http://schemas.microsoft.com/office/drawing/2014/main" xmlns="" id="{6AB6FD9A-1AFC-4807-9449-71974F4B8494}"/>
               </a:ext>
             </a:extLst>
           </p:cNvPr>
@@ -4922,7 +4918,7 @@
           <p:cNvPr id="26" name="Прямоугольник 25">
             <a:extLst>
               <a:ext uri="{FF2B5EF4-FFF2-40B4-BE49-F238E27FC236}">
-                <a16:creationId xmlns="" xmlns:a16="http://schemas.microsoft.com/office/drawing/2014/main" id="{450AF9F7-281C-4F9E-BABF-05CBB22A9EA9}"/>
+                <a16:creationId xmlns:a16="http://schemas.microsoft.com/office/drawing/2014/main" xmlns="" id="{450AF9F7-281C-4F9E-BABF-05CBB22A9EA9}"/>
               </a:ext>
             </a:extLst>
           </p:cNvPr>
@@ -4971,7 +4967,7 @@
           <p:cNvPr id="10" name="Прямоугольник 9">
             <a:extLst>
               <a:ext uri="{FF2B5EF4-FFF2-40B4-BE49-F238E27FC236}">
-                <a16:creationId xmlns="" xmlns:a16="http://schemas.microsoft.com/office/drawing/2014/main" id="{D9DBC35E-48E7-462C-9C9D-0CBCE2EA9228}"/>
+                <a16:creationId xmlns:a16="http://schemas.microsoft.com/office/drawing/2014/main" xmlns="" id="{D9DBC35E-48E7-462C-9C9D-0CBCE2EA9228}"/>
               </a:ext>
             </a:extLst>
           </p:cNvPr>
@@ -5020,7 +5016,7 @@
           <p:cNvPr id="11" name="Прямоугольник 10">
             <a:extLst>
               <a:ext uri="{FF2B5EF4-FFF2-40B4-BE49-F238E27FC236}">
-                <a16:creationId xmlns="" xmlns:a16="http://schemas.microsoft.com/office/drawing/2014/main" id="{77244B79-61B0-4DBC-816D-C65406D31146}"/>
+                <a16:creationId xmlns:a16="http://schemas.microsoft.com/office/drawing/2014/main" xmlns="" id="{77244B79-61B0-4DBC-816D-C65406D31146}"/>
               </a:ext>
             </a:extLst>
           </p:cNvPr>
@@ -5313,15 +5309,7 @@
                   <a:schemeClr val="bg1"/>
                 </a:solidFill>
               </a:rPr>
-              <a:t>Целью курсовой работы является разработка </a:t>
-            </a:r>
-            <a:r>
-              <a:rPr lang="ru-RU" sz="2500" dirty="0" smtClean="0">
-                <a:solidFill>
-                  <a:schemeClr val="bg1"/>
-                </a:solidFill>
-              </a:rPr>
-              <a:t>веб-приложения </a:t>
+              <a:t>Целью курсовой работы является разработка веб-приложения </a:t>
             </a:r>
             <a:r>
               <a:rPr lang="ru-RU" sz="2500" dirty="0" err="1" smtClean="0">
@@ -5736,7 +5724,7 @@
           <p:cNvPr id="2" name="Заголовок 1">
             <a:extLst>
               <a:ext uri="{FF2B5EF4-FFF2-40B4-BE49-F238E27FC236}">
-                <a16:creationId xmlns="" xmlns:a16="http://schemas.microsoft.com/office/drawing/2014/main" id="{C90EBC50-0B1A-4FA5-A84F-9B41E5DAE68F}"/>
+                <a16:creationId xmlns:a16="http://schemas.microsoft.com/office/drawing/2014/main" xmlns="" id="{C90EBC50-0B1A-4FA5-A84F-9B41E5DAE68F}"/>
               </a:ext>
             </a:extLst>
           </p:cNvPr>
@@ -5771,7 +5759,7 @@
           <p:cNvPr id="5" name="TextBox 4">
             <a:extLst>
               <a:ext uri="{FF2B5EF4-FFF2-40B4-BE49-F238E27FC236}">
-                <a16:creationId xmlns="" xmlns:a16="http://schemas.microsoft.com/office/drawing/2014/main" id="{0C36DFE7-A785-443A-8C47-5E53293E5B03}"/>
+                <a16:creationId xmlns:a16="http://schemas.microsoft.com/office/drawing/2014/main" xmlns="" id="{0C36DFE7-A785-443A-8C47-5E53293E5B03}"/>
               </a:ext>
             </a:extLst>
           </p:cNvPr>
@@ -5809,23 +5797,15 @@
                   <a:schemeClr val="accent2"/>
                 </a:solidFill>
               </a:rPr>
-              <a:t>является предоставление и получение услуг </a:t>
-            </a:r>
-            <a:r>
-              <a:rPr lang="ru-RU" sz="3200" dirty="0">
+              <a:t>является </a:t>
+            </a:r>
+            <a:r>
+              <a:rPr lang="ru-RU" sz="3200" dirty="0" smtClean="0">
                 <a:solidFill>
                   <a:schemeClr val="accent2"/>
                 </a:solidFill>
               </a:rPr>
-              <a:t>по </a:t>
-            </a:r>
-            <a:r>
-              <a:rPr lang="ru-RU" sz="3200" dirty="0" smtClean="0">
-                <a:solidFill>
-                  <a:schemeClr val="accent2"/>
-                </a:solidFill>
-              </a:rPr>
-              <a:t>ремонту с возможностью коммуникации между исполнителем и заказчиком по поводу услуги при помощи чата </a:t>
+              <a:t>информационная поддержка малого бизнеса и самозанятых, предоставляющих услуги населению по разнообразным видам ремонта</a:t>
             </a:r>
             <a:endParaRPr lang="ru-RU" sz="3200" dirty="0">
               <a:solidFill>
@@ -5840,7 +5820,7 @@
           <p:cNvPr id="7" name="Прямая соединительная линия 6">
             <a:extLst>
               <a:ext uri="{FF2B5EF4-FFF2-40B4-BE49-F238E27FC236}">
-                <a16:creationId xmlns="" xmlns:a16="http://schemas.microsoft.com/office/drawing/2014/main" id="{06E17476-810A-473C-839C-F99C2DC7380F}"/>
+                <a16:creationId xmlns:a16="http://schemas.microsoft.com/office/drawing/2014/main" xmlns="" id="{06E17476-810A-473C-839C-F99C2DC7380F}"/>
               </a:ext>
             </a:extLst>
           </p:cNvPr>
@@ -5881,7 +5861,7 @@
           <p:cNvPr id="8" name="Прямая соединительная линия 7">
             <a:extLst>
               <a:ext uri="{FF2B5EF4-FFF2-40B4-BE49-F238E27FC236}">
-                <a16:creationId xmlns="" xmlns:a16="http://schemas.microsoft.com/office/drawing/2014/main" id="{2060357F-DE11-421D-853D-70018423605E}"/>
+                <a16:creationId xmlns:a16="http://schemas.microsoft.com/office/drawing/2014/main" xmlns="" id="{2060357F-DE11-421D-853D-70018423605E}"/>
               </a:ext>
             </a:extLst>
           </p:cNvPr>
@@ -5971,7 +5951,7 @@
           <p:cNvPr id="2" name="Заголовок 1">
             <a:extLst>
               <a:ext uri="{FF2B5EF4-FFF2-40B4-BE49-F238E27FC236}">
-                <a16:creationId xmlns="" xmlns:a16="http://schemas.microsoft.com/office/drawing/2014/main" id="{C3D69FB5-73CD-4EAB-9F49-153919DA4C48}"/>
+                <a16:creationId xmlns:a16="http://schemas.microsoft.com/office/drawing/2014/main" xmlns="" id="{C3D69FB5-73CD-4EAB-9F49-153919DA4C48}"/>
               </a:ext>
             </a:extLst>
           </p:cNvPr>
@@ -5997,7 +5977,6 @@
               <a:rPr lang="ru-RU" dirty="0"/>
               <a:t>Архитектура системы</a:t>
             </a:r>
-            <a:endParaRPr lang="ru-RU" dirty="0"/>
           </a:p>
         </p:txBody>
       </p:sp>
@@ -6006,7 +5985,7 @@
           <p:cNvPr id="8" name="TextBox 7">
             <a:extLst>
               <a:ext uri="{FF2B5EF4-FFF2-40B4-BE49-F238E27FC236}">
-                <a16:creationId xmlns="" xmlns:a16="http://schemas.microsoft.com/office/drawing/2014/main" id="{0C36DFE7-A785-443A-8C47-5E53293E5B03}"/>
+                <a16:creationId xmlns:a16="http://schemas.microsoft.com/office/drawing/2014/main" xmlns="" id="{0C36DFE7-A785-443A-8C47-5E53293E5B03}"/>
               </a:ext>
             </a:extLst>
           </p:cNvPr>
@@ -6133,7 +6112,7 @@
           <p:cNvPr id="2" name="Заголовок 1">
             <a:extLst>
               <a:ext uri="{FF2B5EF4-FFF2-40B4-BE49-F238E27FC236}">
-                <a16:creationId xmlns="" xmlns:a16="http://schemas.microsoft.com/office/drawing/2014/main" id="{C3D69FB5-73CD-4EAB-9F49-153919DA4C48}"/>
+                <a16:creationId xmlns:a16="http://schemas.microsoft.com/office/drawing/2014/main" xmlns="" id="{C3D69FB5-73CD-4EAB-9F49-153919DA4C48}"/>
               </a:ext>
             </a:extLst>
           </p:cNvPr>
@@ -6203,13 +6182,13 @@
   <p:clrMapOvr>
     <a:masterClrMapping/>
   </p:clrMapOvr>
-  <mc:AlternateContent xmlns:mc="http://schemas.openxmlformats.org/markup-compatibility/2006">
-    <mc:Choice xmlns:p14="http://schemas.microsoft.com/office/powerpoint/2010/main" Requires="p14">
+  <mc:AlternateContent xmlns:mc="http://schemas.openxmlformats.org/markup-compatibility/2006" xmlns:p14="http://schemas.microsoft.com/office/powerpoint/2010/main">
+    <mc:Choice Requires="p14">
       <p:transition spd="med" p14:dur="700">
         <p:fade/>
       </p:transition>
     </mc:Choice>
-    <mc:Fallback>
+    <mc:Fallback xmlns="">
       <p:transition spd="med">
         <p:fade/>
       </p:transition>
@@ -6247,7 +6226,7 @@
           <p:cNvPr id="2" name="Заголовок 1">
             <a:extLst>
               <a:ext uri="{FF2B5EF4-FFF2-40B4-BE49-F238E27FC236}">
-                <a16:creationId xmlns="" xmlns:a16="http://schemas.microsoft.com/office/drawing/2014/main" id="{C3D69FB5-73CD-4EAB-9F49-153919DA4C48}"/>
+                <a16:creationId xmlns:a16="http://schemas.microsoft.com/office/drawing/2014/main" xmlns="" id="{C3D69FB5-73CD-4EAB-9F49-153919DA4C48}"/>
               </a:ext>
             </a:extLst>
           </p:cNvPr>
@@ -6273,7 +6252,6 @@
               <a:rPr lang="ru-RU" dirty="0"/>
               <a:t>Скриншоты пользовательского интерфейса</a:t>
             </a:r>
-            <a:endParaRPr lang="ru-RU" dirty="0"/>
           </a:p>
         </p:txBody>
       </p:sp>
@@ -6347,13 +6325,13 @@
   <p:clrMapOvr>
     <a:masterClrMapping/>
   </p:clrMapOvr>
-  <mc:AlternateContent xmlns:mc="http://schemas.openxmlformats.org/markup-compatibility/2006">
-    <mc:Choice xmlns:p14="http://schemas.microsoft.com/office/powerpoint/2010/main" Requires="p14">
+  <mc:AlternateContent xmlns:mc="http://schemas.openxmlformats.org/markup-compatibility/2006" xmlns:p14="http://schemas.microsoft.com/office/powerpoint/2010/main">
+    <mc:Choice Requires="p14">
       <p:transition spd="med" p14:dur="700">
         <p:fade/>
       </p:transition>
     </mc:Choice>
-    <mc:Fallback>
+    <mc:Fallback xmlns="">
       <p:transition spd="med">
         <p:fade/>
       </p:transition>
@@ -6391,7 +6369,7 @@
           <p:cNvPr id="2" name="Заголовок 1">
             <a:extLst>
               <a:ext uri="{FF2B5EF4-FFF2-40B4-BE49-F238E27FC236}">
-                <a16:creationId xmlns="" xmlns:a16="http://schemas.microsoft.com/office/drawing/2014/main" id="{C3D69FB5-73CD-4EAB-9F49-153919DA4C48}"/>
+                <a16:creationId xmlns:a16="http://schemas.microsoft.com/office/drawing/2014/main" xmlns="" id="{C3D69FB5-73CD-4EAB-9F49-153919DA4C48}"/>
               </a:ext>
             </a:extLst>
           </p:cNvPr>
@@ -6417,7 +6395,6 @@
               <a:rPr lang="ru-RU" dirty="0"/>
               <a:t>Скриншоты пользовательского интерфейса</a:t>
             </a:r>
-            <a:endParaRPr lang="ru-RU" dirty="0"/>
           </a:p>
         </p:txBody>
       </p:sp>
@@ -6515,13 +6492,13 @@
   <p:clrMapOvr>
     <a:masterClrMapping/>
   </p:clrMapOvr>
-  <mc:AlternateContent xmlns:mc="http://schemas.openxmlformats.org/markup-compatibility/2006">
-    <mc:Choice xmlns:p14="http://schemas.microsoft.com/office/powerpoint/2010/main" Requires="p14">
+  <mc:AlternateContent xmlns:mc="http://schemas.openxmlformats.org/markup-compatibility/2006" xmlns:p14="http://schemas.microsoft.com/office/powerpoint/2010/main">
+    <mc:Choice Requires="p14">
       <p:transition spd="med" p14:dur="700">
         <p:fade/>
       </p:transition>
     </mc:Choice>
-    <mc:Fallback>
+    <mc:Fallback xmlns="">
       <p:transition spd="med">
         <p:fade/>
       </p:transition>
@@ -6559,7 +6536,7 @@
           <p:cNvPr id="27" name="Прямоугольник 26">
             <a:extLst>
               <a:ext uri="{FF2B5EF4-FFF2-40B4-BE49-F238E27FC236}">
-                <a16:creationId xmlns="" xmlns:a16="http://schemas.microsoft.com/office/drawing/2014/main" id="{6AB6FD9A-1AFC-4807-9449-71974F4B8494}"/>
+                <a16:creationId xmlns:a16="http://schemas.microsoft.com/office/drawing/2014/main" xmlns="" id="{6AB6FD9A-1AFC-4807-9449-71974F4B8494}"/>
               </a:ext>
             </a:extLst>
           </p:cNvPr>
@@ -6608,7 +6585,7 @@
           <p:cNvPr id="26" name="Прямоугольник 25">
             <a:extLst>
               <a:ext uri="{FF2B5EF4-FFF2-40B4-BE49-F238E27FC236}">
-                <a16:creationId xmlns="" xmlns:a16="http://schemas.microsoft.com/office/drawing/2014/main" id="{450AF9F7-281C-4F9E-BABF-05CBB22A9EA9}"/>
+                <a16:creationId xmlns:a16="http://schemas.microsoft.com/office/drawing/2014/main" xmlns="" id="{450AF9F7-281C-4F9E-BABF-05CBB22A9EA9}"/>
               </a:ext>
             </a:extLst>
           </p:cNvPr>
@@ -6657,7 +6634,7 @@
           <p:cNvPr id="10" name="Прямоугольник 9">
             <a:extLst>
               <a:ext uri="{FF2B5EF4-FFF2-40B4-BE49-F238E27FC236}">
-                <a16:creationId xmlns="" xmlns:a16="http://schemas.microsoft.com/office/drawing/2014/main" id="{D9DBC35E-48E7-462C-9C9D-0CBCE2EA9228}"/>
+                <a16:creationId xmlns:a16="http://schemas.microsoft.com/office/drawing/2014/main" xmlns="" id="{D9DBC35E-48E7-462C-9C9D-0CBCE2EA9228}"/>
               </a:ext>
             </a:extLst>
           </p:cNvPr>
@@ -6706,7 +6683,7 @@
           <p:cNvPr id="11" name="Прямоугольник 10">
             <a:extLst>
               <a:ext uri="{FF2B5EF4-FFF2-40B4-BE49-F238E27FC236}">
-                <a16:creationId xmlns="" xmlns:a16="http://schemas.microsoft.com/office/drawing/2014/main" id="{77244B79-61B0-4DBC-816D-C65406D31146}"/>
+                <a16:creationId xmlns:a16="http://schemas.microsoft.com/office/drawing/2014/main" xmlns="" id="{77244B79-61B0-4DBC-816D-C65406D31146}"/>
               </a:ext>
             </a:extLst>
           </p:cNvPr>
@@ -7203,7 +7180,7 @@
           <p:cNvPr id="12" name="Заголовок 1">
             <a:extLst>
               <a:ext uri="{FF2B5EF4-FFF2-40B4-BE49-F238E27FC236}">
-                <a16:creationId xmlns="" xmlns:a16="http://schemas.microsoft.com/office/drawing/2014/main" id="{C90EBC50-0B1A-4FA5-A84F-9B41E5DAE68F}"/>
+                <a16:creationId xmlns:a16="http://schemas.microsoft.com/office/drawing/2014/main" xmlns="" id="{C90EBC50-0B1A-4FA5-A84F-9B41E5DAE68F}"/>
               </a:ext>
             </a:extLst>
           </p:cNvPr>
@@ -7246,13 +7223,13 @@
   <p:clrMapOvr>
     <a:masterClrMapping/>
   </p:clrMapOvr>
-  <mc:AlternateContent xmlns:mc="http://schemas.openxmlformats.org/markup-compatibility/2006">
-    <mc:Choice xmlns:p14="http://schemas.microsoft.com/office/powerpoint/2010/main" Requires="p14">
+  <mc:AlternateContent xmlns:mc="http://schemas.openxmlformats.org/markup-compatibility/2006" xmlns:p14="http://schemas.microsoft.com/office/powerpoint/2010/main">
+    <mc:Choice Requires="p14">
       <p:transition spd="med" p14:dur="700">
         <p:fade/>
       </p:transition>
     </mc:Choice>
-    <mc:Fallback>
+    <mc:Fallback xmlns="">
       <p:transition spd="med">
         <p:fade/>
       </p:transition>
@@ -7290,7 +7267,7 @@
           <p:cNvPr id="4" name="Прямоугольник 3">
             <a:extLst>
               <a:ext uri="{FF2B5EF4-FFF2-40B4-BE49-F238E27FC236}">
-                <a16:creationId xmlns="" xmlns:a16="http://schemas.microsoft.com/office/drawing/2014/main" id="{67DF6E54-D19C-4CD4-8F96-28069ABFC599}"/>
+                <a16:creationId xmlns:a16="http://schemas.microsoft.com/office/drawing/2014/main" xmlns="" id="{67DF6E54-D19C-4CD4-8F96-28069ABFC599}"/>
               </a:ext>
             </a:extLst>
           </p:cNvPr>
@@ -7344,7 +7321,7 @@
           <p:cNvPr id="5" name="Заголовок 9">
             <a:extLst>
               <a:ext uri="{FF2B5EF4-FFF2-40B4-BE49-F238E27FC236}">
-                <a16:creationId xmlns="" xmlns:a16="http://schemas.microsoft.com/office/drawing/2014/main" id="{A7E80435-8CBD-49DE-A3E2-BAA82F873308}"/>
+                <a16:creationId xmlns:a16="http://schemas.microsoft.com/office/drawing/2014/main" xmlns="" id="{A7E80435-8CBD-49DE-A3E2-BAA82F873308}"/>
               </a:ext>
             </a:extLst>
           </p:cNvPr>

</xml_diff>